<commit_message>
updated day1 and started day2
</commit_message>
<xml_diff>
--- a/slides/day1.pptx
+++ b/slides/day1.pptx
@@ -32,6 +32,7 @@
     <p:sldId id="280" r:id="rId26"/>
     <p:sldId id="281" r:id="rId27"/>
     <p:sldId id="282" r:id="rId28"/>
+    <p:sldId id="283" r:id="rId29"/>
   </p:sldIdLst>
   <p:sldSz cx="12192000" cy="6858000"/>
   <p:notesSz cx="6858000" cy="9144000"/>
@@ -130,6 +131,11 @@
       </a:defRPr>
     </a:lvl9pPr>
   </p:defaultTextStyle>
+  <p:extLst>
+    <p:ext uri="{EFAFB233-063F-42B5-8137-9DF3F51BA10A}">
+      <p15:sldGuideLst xmlns:p15="http://schemas.microsoft.com/office/powerpoint/2012/main"/>
+    </p:ext>
+  </p:extLst>
 </p:presentation>
 </file>
 
@@ -284,7 +290,7 @@
           <a:p>
             <a:fld id="{92B9B555-E3F5-4671-B1E1-536C1FE5E107}" type="datetimeFigureOut">
               <a:rPr lang="en-US" smtClean="0"/>
-              <a:t>9/26/2017</a:t>
+              <a:t>9/28/2017</a:t>
             </a:fld>
             <a:endParaRPr lang="en-US"/>
           </a:p>
@@ -482,7 +488,7 @@
           <a:p>
             <a:fld id="{92B9B555-E3F5-4671-B1E1-536C1FE5E107}" type="datetimeFigureOut">
               <a:rPr lang="en-US" smtClean="0"/>
-              <a:t>9/26/2017</a:t>
+              <a:t>9/28/2017</a:t>
             </a:fld>
             <a:endParaRPr lang="en-US"/>
           </a:p>
@@ -690,7 +696,7 @@
           <a:p>
             <a:fld id="{92B9B555-E3F5-4671-B1E1-536C1FE5E107}" type="datetimeFigureOut">
               <a:rPr lang="en-US" smtClean="0"/>
-              <a:t>9/26/2017</a:t>
+              <a:t>9/28/2017</a:t>
             </a:fld>
             <a:endParaRPr lang="en-US"/>
           </a:p>
@@ -888,7 +894,7 @@
           <a:p>
             <a:fld id="{92B9B555-E3F5-4671-B1E1-536C1FE5E107}" type="datetimeFigureOut">
               <a:rPr lang="en-US" smtClean="0"/>
-              <a:t>9/26/2017</a:t>
+              <a:t>9/28/2017</a:t>
             </a:fld>
             <a:endParaRPr lang="en-US"/>
           </a:p>
@@ -1163,7 +1169,7 @@
           <a:p>
             <a:fld id="{92B9B555-E3F5-4671-B1E1-536C1FE5E107}" type="datetimeFigureOut">
               <a:rPr lang="en-US" smtClean="0"/>
-              <a:t>9/26/2017</a:t>
+              <a:t>9/28/2017</a:t>
             </a:fld>
             <a:endParaRPr lang="en-US"/>
           </a:p>
@@ -1428,7 +1434,7 @@
           <a:p>
             <a:fld id="{92B9B555-E3F5-4671-B1E1-536C1FE5E107}" type="datetimeFigureOut">
               <a:rPr lang="en-US" smtClean="0"/>
-              <a:t>9/26/2017</a:t>
+              <a:t>9/28/2017</a:t>
             </a:fld>
             <a:endParaRPr lang="en-US"/>
           </a:p>
@@ -1840,7 +1846,7 @@
           <a:p>
             <a:fld id="{92B9B555-E3F5-4671-B1E1-536C1FE5E107}" type="datetimeFigureOut">
               <a:rPr lang="en-US" smtClean="0"/>
-              <a:t>9/26/2017</a:t>
+              <a:t>9/28/2017</a:t>
             </a:fld>
             <a:endParaRPr lang="en-US"/>
           </a:p>
@@ -1981,7 +1987,7 @@
           <a:p>
             <a:fld id="{92B9B555-E3F5-4671-B1E1-536C1FE5E107}" type="datetimeFigureOut">
               <a:rPr lang="en-US" smtClean="0"/>
-              <a:t>9/26/2017</a:t>
+              <a:t>9/28/2017</a:t>
             </a:fld>
             <a:endParaRPr lang="en-US"/>
           </a:p>
@@ -2094,7 +2100,7 @@
           <a:p>
             <a:fld id="{92B9B555-E3F5-4671-B1E1-536C1FE5E107}" type="datetimeFigureOut">
               <a:rPr lang="en-US" smtClean="0"/>
-              <a:t>9/26/2017</a:t>
+              <a:t>9/28/2017</a:t>
             </a:fld>
             <a:endParaRPr lang="en-US"/>
           </a:p>
@@ -2405,7 +2411,7 @@
           <a:p>
             <a:fld id="{92B9B555-E3F5-4671-B1E1-536C1FE5E107}" type="datetimeFigureOut">
               <a:rPr lang="en-US" smtClean="0"/>
-              <a:t>9/26/2017</a:t>
+              <a:t>9/28/2017</a:t>
             </a:fld>
             <a:endParaRPr lang="en-US"/>
           </a:p>
@@ -2693,7 +2699,7 @@
           <a:p>
             <a:fld id="{92B9B555-E3F5-4671-B1E1-536C1FE5E107}" type="datetimeFigureOut">
               <a:rPr lang="en-US" smtClean="0"/>
-              <a:t>9/26/2017</a:t>
+              <a:t>9/28/2017</a:t>
             </a:fld>
             <a:endParaRPr lang="en-US"/>
           </a:p>
@@ -2934,7 +2940,7 @@
           <a:p>
             <a:fld id="{92B9B555-E3F5-4671-B1E1-536C1FE5E107}" type="datetimeFigureOut">
               <a:rPr lang="en-US" smtClean="0"/>
-              <a:t>9/26/2017</a:t>
+              <a:t>9/28/2017</a:t>
             </a:fld>
             <a:endParaRPr lang="en-US"/>
           </a:p>
@@ -3400,7 +3406,10 @@
           <a:bodyPr/>
           <a:lstStyle/>
           <a:p>
-            <a:endParaRPr lang="en-US"/>
+            <a:r>
+              <a:rPr lang="en-US" dirty="0"/>
+              <a:t>Day 1</a:t>
+            </a:r>
           </a:p>
         </p:txBody>
       </p:sp>
@@ -6464,6 +6473,171 @@
     <p:extLst>
       <p:ext uri="{BB962C8B-B14F-4D97-AF65-F5344CB8AC3E}">
         <p14:creationId xmlns:p14="http://schemas.microsoft.com/office/powerpoint/2010/main" val="3190955005"/>
+      </p:ext>
+    </p:extLst>
+  </p:cSld>
+  <p:clrMapOvr>
+    <a:masterClrMapping/>
+  </p:clrMapOvr>
+</p:sld>
+</file>
+
+<file path=ppt/slides/slide28.xml><?xml version="1.0" encoding="utf-8"?>
+<p:sld xmlns:a="http://schemas.openxmlformats.org/drawingml/2006/main" xmlns:r="http://schemas.openxmlformats.org/officeDocument/2006/relationships" xmlns:p="http://schemas.openxmlformats.org/presentationml/2006/main">
+  <p:cSld>
+    <p:spTree>
+      <p:nvGrpSpPr>
+        <p:cNvPr id="1" name=""/>
+        <p:cNvGrpSpPr/>
+        <p:nvPr/>
+      </p:nvGrpSpPr>
+      <p:grpSpPr>
+        <a:xfrm>
+          <a:off x="0" y="0"/>
+          <a:ext cx="0" cy="0"/>
+          <a:chOff x="0" y="0"/>
+          <a:chExt cx="0" cy="0"/>
+        </a:xfrm>
+      </p:grpSpPr>
+      <p:sp>
+        <p:nvSpPr>
+          <p:cNvPr id="2" name="Title 1">
+            <a:extLst>
+              <a:ext uri="{FF2B5EF4-FFF2-40B4-BE49-F238E27FC236}">
+                <a16:creationId xmlns:a16="http://schemas.microsoft.com/office/drawing/2014/main" id="{6114C624-85E0-4758-B640-F02EE1CEAD79}"/>
+              </a:ext>
+            </a:extLst>
+          </p:cNvPr>
+          <p:cNvSpPr>
+            <a:spLocks noGrp="1"/>
+          </p:cNvSpPr>
+          <p:nvPr>
+            <p:ph type="title"/>
+          </p:nvPr>
+        </p:nvSpPr>
+        <p:spPr/>
+        <p:txBody>
+          <a:bodyPr/>
+          <a:lstStyle/>
+          <a:p>
+            <a:r>
+              <a:rPr lang="en-US" dirty="0"/>
+              <a:t>Challenge</a:t>
+            </a:r>
+          </a:p>
+        </p:txBody>
+      </p:sp>
+      <p:sp>
+        <p:nvSpPr>
+          <p:cNvPr id="3" name="Content Placeholder 2">
+            <a:extLst>
+              <a:ext uri="{FF2B5EF4-FFF2-40B4-BE49-F238E27FC236}">
+                <a16:creationId xmlns:a16="http://schemas.microsoft.com/office/drawing/2014/main" id="{C00A7AF6-5BED-4F80-971D-BE3862C8BB0C}"/>
+              </a:ext>
+            </a:extLst>
+          </p:cNvPr>
+          <p:cNvSpPr>
+            <a:spLocks noGrp="1"/>
+          </p:cNvSpPr>
+          <p:nvPr>
+            <p:ph sz="half" idx="1"/>
+          </p:nvPr>
+        </p:nvSpPr>
+        <p:spPr>
+          <a:xfrm>
+            <a:off x="838200" y="1825625"/>
+            <a:ext cx="9717350" cy="4351338"/>
+          </a:xfrm>
+        </p:spPr>
+        <p:txBody>
+          <a:bodyPr/>
+          <a:lstStyle/>
+          <a:p>
+            <a:r>
+              <a:rPr lang="en-US" dirty="0"/>
+              <a:t>Harris-Benedict BMR calculator</a:t>
+            </a:r>
+          </a:p>
+          <a:p>
+            <a:r>
+              <a:rPr lang="en-US" dirty="0"/>
+              <a:t>Female</a:t>
+            </a:r>
+          </a:p>
+          <a:p>
+            <a:pPr lvl="1"/>
+            <a:r>
+              <a:rPr lang="en-US" dirty="0" err="1"/>
+              <a:t>Bmr</a:t>
+            </a:r>
+            <a:r>
+              <a:rPr lang="en-US" dirty="0"/>
+              <a:t> = 655 + (4.3* weight </a:t>
+            </a:r>
+            <a:r>
+              <a:rPr lang="en-US" dirty="0" err="1"/>
+              <a:t>lbs</a:t>
+            </a:r>
+            <a:r>
+              <a:rPr lang="en-US" dirty="0"/>
+              <a:t>) + (4.7 * height inch) – (4.7 * age)</a:t>
+            </a:r>
+          </a:p>
+          <a:p>
+            <a:r>
+              <a:rPr lang="en-US" dirty="0"/>
+              <a:t>Male</a:t>
+            </a:r>
+          </a:p>
+          <a:p>
+            <a:pPr lvl="1"/>
+            <a:r>
+              <a:rPr lang="en-US" dirty="0" err="1"/>
+              <a:t>Bmr</a:t>
+            </a:r>
+            <a:r>
+              <a:rPr lang="en-US" dirty="0"/>
+              <a:t> = 66 + (6.3* weight </a:t>
+            </a:r>
+            <a:r>
+              <a:rPr lang="en-US" dirty="0" err="1"/>
+              <a:t>lbs</a:t>
+            </a:r>
+            <a:r>
+              <a:rPr lang="en-US" dirty="0"/>
+              <a:t>) + (12.9 * height inch) – (6.8 * age)</a:t>
+            </a:r>
+          </a:p>
+          <a:p>
+            <a:endParaRPr lang="en-US" dirty="0"/>
+          </a:p>
+          <a:p>
+            <a:r>
+              <a:rPr lang="en-US" dirty="0"/>
+              <a:t>Get interactive input in a python script</a:t>
+            </a:r>
+          </a:p>
+          <a:p>
+            <a:pPr lvl="1"/>
+            <a:r>
+              <a:rPr lang="en-US" dirty="0"/>
+              <a:t>“</a:t>
+            </a:r>
+            <a:r>
+              <a:rPr lang="en-US" dirty="0" err="1"/>
+              <a:t>users_name</a:t>
+            </a:r>
+            <a:r>
+              <a:rPr lang="en-US" dirty="0"/>
+              <a:t> = input(“please enter your name: ”)</a:t>
+            </a:r>
+          </a:p>
+        </p:txBody>
+      </p:sp>
+    </p:spTree>
+    <p:extLst>
+      <p:ext uri="{BB962C8B-B14F-4D97-AF65-F5344CB8AC3E}">
+        <p14:creationId xmlns:p14="http://schemas.microsoft.com/office/powerpoint/2010/main" val="3925303879"/>
       </p:ext>
     </p:extLst>
   </p:cSld>

</xml_diff>